<commit_message>
Google drive link added
</commit_message>
<xml_diff>
--- a/OList_Retail_Analytics.pptx
+++ b/OList_Retail_Analytics.pptx
@@ -17,6 +17,8 @@
     <p:sldId id="271" r:id="rId11"/>
     <p:sldId id="272" r:id="rId12"/>
     <p:sldId id="268" r:id="rId13"/>
+    <p:sldId id="274" r:id="rId14"/>
+    <p:sldId id="275" r:id="rId15"/>
   </p:sldIdLst>
   <p:sldSz cx="9144000" cy="6858000" type="screen4x3"/>
   <p:notesSz cx="6858000" cy="9144000"/>
@@ -118,7 +120,7 @@
   <p:extLst>
     <p:ext uri="{EFAFB233-063F-42B5-8137-9DF3F51BA10A}">
       <p15:sldGuideLst xmlns:p15="http://schemas.microsoft.com/office/powerpoint/2012/main">
-        <p15:guide id="1" orient="horz" pos="2160">
+        <p15:guide id="1" orient="horz" pos="2183" userDrawn="1">
           <p15:clr>
             <a:srgbClr val="A4A3A4"/>
           </p15:clr>
@@ -6646,6 +6648,362 @@
 </p:sld>
 </file>
 
+<file path=ppt/slides/slide13.xml><?xml version="1.0" encoding="utf-8"?>
+<p:sld xmlns:a="http://schemas.openxmlformats.org/drawingml/2006/main" xmlns:r="http://schemas.openxmlformats.org/officeDocument/2006/relationships" xmlns:p="http://schemas.openxmlformats.org/presentationml/2006/main">
+  <p:cSld>
+    <p:spTree>
+      <p:nvGrpSpPr>
+        <p:cNvPr id="1" name="">
+          <a:extLst>
+            <a:ext uri="{FF2B5EF4-FFF2-40B4-BE49-F238E27FC236}">
+              <a16:creationId xmlns:a16="http://schemas.microsoft.com/office/drawing/2014/main" id="{10846EFC-3862-31CA-2A60-64F8A9B2A24D}"/>
+            </a:ext>
+          </a:extLst>
+        </p:cNvPr>
+        <p:cNvGrpSpPr/>
+        <p:nvPr/>
+      </p:nvGrpSpPr>
+      <p:grpSpPr>
+        <a:xfrm>
+          <a:off x="0" y="0"/>
+          <a:ext cx="0" cy="0"/>
+          <a:chOff x="0" y="0"/>
+          <a:chExt cx="0" cy="0"/>
+        </a:xfrm>
+      </p:grpSpPr>
+      <p:sp>
+        <p:nvSpPr>
+          <p:cNvPr id="5" name="Title 4">
+            <a:extLst>
+              <a:ext uri="{FF2B5EF4-FFF2-40B4-BE49-F238E27FC236}">
+                <a16:creationId xmlns:a16="http://schemas.microsoft.com/office/drawing/2014/main" id="{9969F491-BAF8-C8D1-63BF-B36CA3032ABF}"/>
+              </a:ext>
+            </a:extLst>
+          </p:cNvPr>
+          <p:cNvSpPr>
+            <a:spLocks noGrp="1"/>
+          </p:cNvSpPr>
+          <p:nvPr>
+            <p:ph type="title"/>
+          </p:nvPr>
+        </p:nvSpPr>
+        <p:spPr>
+          <a:xfrm>
+            <a:off x="1129184" y="1389018"/>
+            <a:ext cx="6885631" cy="666206"/>
+          </a:xfrm>
+        </p:spPr>
+        <p:txBody>
+          <a:bodyPr anchor="t">
+            <a:noAutofit/>
+          </a:bodyPr>
+          <a:lstStyle/>
+          <a:p>
+            <a:r>
+              <a:rPr lang="en-US" sz="1400" cap="none" dirty="0">
+                <a:hlinkClick r:id="rId2"/>
+              </a:rPr>
+              <a:t>https://drive.google.com/drive/u/4/folders/1694yDfZO7pRGVSQ_KvnXp-UfP57cJTcV</a:t>
+            </a:r>
+            <a:br>
+              <a:rPr lang="en-US" sz="1400" cap="none" dirty="0"/>
+            </a:br>
+            <a:br>
+              <a:rPr lang="en-US" sz="1400" cap="none" dirty="0"/>
+            </a:br>
+            <a:endParaRPr lang="en-IN" sz="1400" cap="none" dirty="0">
+              <a:solidFill>
+                <a:schemeClr val="bg2">
+                  <a:lumMod val="75000"/>
+                </a:schemeClr>
+              </a:solidFill>
+            </a:endParaRPr>
+          </a:p>
+        </p:txBody>
+      </p:sp>
+      <p:sp>
+        <p:nvSpPr>
+          <p:cNvPr id="6" name="Title 4">
+            <a:extLst>
+              <a:ext uri="{FF2B5EF4-FFF2-40B4-BE49-F238E27FC236}">
+                <a16:creationId xmlns:a16="http://schemas.microsoft.com/office/drawing/2014/main" id="{33837DD5-04EE-7730-97B8-19E8C039BB3C}"/>
+              </a:ext>
+            </a:extLst>
+          </p:cNvPr>
+          <p:cNvSpPr txBox="1">
+            <a:spLocks/>
+          </p:cNvSpPr>
+          <p:nvPr/>
+        </p:nvSpPr>
+        <p:spPr>
+          <a:xfrm>
+            <a:off x="1019249" y="156884"/>
+            <a:ext cx="7105502" cy="666205"/>
+          </a:xfrm>
+          <a:prstGeom prst="rect">
+            <a:avLst/>
+          </a:prstGeom>
+          <a:effectLst/>
+        </p:spPr>
+        <p:txBody>
+          <a:bodyPr vert="horz" lIns="91440" tIns="45720" rIns="91440" bIns="45720" rtlCol="0" anchor="ctr">
+            <a:noAutofit/>
+          </a:bodyPr>
+          <a:lstStyle>
+            <a:lvl1pPr algn="l" defTabSz="457200" rtl="0" eaLnBrk="1" latinLnBrk="0" hangingPunct="1">
+              <a:spcBef>
+                <a:spcPct val="0"/>
+              </a:spcBef>
+              <a:buNone/>
+              <a:defRPr sz="3200" kern="1200" cap="all">
+                <a:ln w="3175" cmpd="sng">
+                  <a:noFill/>
+                </a:ln>
+                <a:solidFill>
+                  <a:schemeClr val="tx1"/>
+                </a:solidFill>
+                <a:effectLst/>
+                <a:latin typeface="+mj-lt"/>
+                <a:ea typeface="+mj-ea"/>
+                <a:cs typeface="+mj-cs"/>
+              </a:defRPr>
+            </a:lvl1pPr>
+            <a:lvl2pPr eaLnBrk="1" hangingPunct="1">
+              <a:defRPr>
+                <a:solidFill>
+                  <a:schemeClr val="tx2"/>
+                </a:solidFill>
+              </a:defRPr>
+            </a:lvl2pPr>
+            <a:lvl3pPr eaLnBrk="1" hangingPunct="1">
+              <a:defRPr>
+                <a:solidFill>
+                  <a:schemeClr val="tx2"/>
+                </a:solidFill>
+              </a:defRPr>
+            </a:lvl3pPr>
+            <a:lvl4pPr eaLnBrk="1" hangingPunct="1">
+              <a:defRPr>
+                <a:solidFill>
+                  <a:schemeClr val="tx2"/>
+                </a:solidFill>
+              </a:defRPr>
+            </a:lvl4pPr>
+            <a:lvl5pPr eaLnBrk="1" hangingPunct="1">
+              <a:defRPr>
+                <a:solidFill>
+                  <a:schemeClr val="tx2"/>
+                </a:solidFill>
+              </a:defRPr>
+            </a:lvl5pPr>
+            <a:lvl6pPr eaLnBrk="1" hangingPunct="1">
+              <a:defRPr>
+                <a:solidFill>
+                  <a:schemeClr val="tx2"/>
+                </a:solidFill>
+              </a:defRPr>
+            </a:lvl6pPr>
+            <a:lvl7pPr eaLnBrk="1" hangingPunct="1">
+              <a:defRPr>
+                <a:solidFill>
+                  <a:schemeClr val="tx2"/>
+                </a:solidFill>
+              </a:defRPr>
+            </a:lvl7pPr>
+            <a:lvl8pPr eaLnBrk="1" hangingPunct="1">
+              <a:defRPr>
+                <a:solidFill>
+                  <a:schemeClr val="tx2"/>
+                </a:solidFill>
+              </a:defRPr>
+            </a:lvl8pPr>
+            <a:lvl9pPr eaLnBrk="1" hangingPunct="1">
+              <a:defRPr>
+                <a:solidFill>
+                  <a:schemeClr val="tx2"/>
+                </a:solidFill>
+              </a:defRPr>
+            </a:lvl9pPr>
+          </a:lstStyle>
+          <a:p>
+            <a:pPr algn="ctr"/>
+            <a:r>
+              <a:rPr lang="en-IN" b="1" dirty="0">
+                <a:solidFill>
+                  <a:srgbClr val="002060"/>
+                </a:solidFill>
+              </a:rPr>
+              <a:t>Video Link</a:t>
+            </a:r>
+          </a:p>
+        </p:txBody>
+      </p:sp>
+    </p:spTree>
+    <p:extLst>
+      <p:ext uri="{BB962C8B-B14F-4D97-AF65-F5344CB8AC3E}">
+        <p14:creationId xmlns:p14="http://schemas.microsoft.com/office/powerpoint/2010/main" val="932279447"/>
+      </p:ext>
+    </p:extLst>
+  </p:cSld>
+  <p:clrMapOvr>
+    <a:masterClrMapping/>
+  </p:clrMapOvr>
+</p:sld>
+</file>
+
+<file path=ppt/slides/slide14.xml><?xml version="1.0" encoding="utf-8"?>
+<p:sld xmlns:a="http://schemas.openxmlformats.org/drawingml/2006/main" xmlns:r="http://schemas.openxmlformats.org/officeDocument/2006/relationships" xmlns:p="http://schemas.openxmlformats.org/presentationml/2006/main">
+  <p:cSld>
+    <p:spTree>
+      <p:nvGrpSpPr>
+        <p:cNvPr id="1" name="">
+          <a:extLst>
+            <a:ext uri="{FF2B5EF4-FFF2-40B4-BE49-F238E27FC236}">
+              <a16:creationId xmlns:a16="http://schemas.microsoft.com/office/drawing/2014/main" id="{7ED24593-5D85-4DDF-28DE-C56D47B76D13}"/>
+            </a:ext>
+          </a:extLst>
+        </p:cNvPr>
+        <p:cNvGrpSpPr/>
+        <p:nvPr/>
+      </p:nvGrpSpPr>
+      <p:grpSpPr>
+        <a:xfrm>
+          <a:off x="0" y="0"/>
+          <a:ext cx="0" cy="0"/>
+          <a:chOff x="0" y="0"/>
+          <a:chExt cx="0" cy="0"/>
+        </a:xfrm>
+      </p:grpSpPr>
+      <p:sp>
+        <p:nvSpPr>
+          <p:cNvPr id="6" name="Title 4">
+            <a:extLst>
+              <a:ext uri="{FF2B5EF4-FFF2-40B4-BE49-F238E27FC236}">
+                <a16:creationId xmlns:a16="http://schemas.microsoft.com/office/drawing/2014/main" id="{EF425DA6-48FE-01E5-842A-8E1B542E9864}"/>
+              </a:ext>
+            </a:extLst>
+          </p:cNvPr>
+          <p:cNvSpPr txBox="1">
+            <a:spLocks/>
+          </p:cNvSpPr>
+          <p:nvPr/>
+        </p:nvSpPr>
+        <p:spPr>
+          <a:xfrm>
+            <a:off x="1019249" y="3095897"/>
+            <a:ext cx="7105502" cy="666205"/>
+          </a:xfrm>
+          <a:prstGeom prst="rect">
+            <a:avLst/>
+          </a:prstGeom>
+          <a:effectLst/>
+        </p:spPr>
+        <p:txBody>
+          <a:bodyPr vert="horz" lIns="91440" tIns="45720" rIns="91440" bIns="45720" rtlCol="0" anchor="ctr">
+            <a:noAutofit/>
+          </a:bodyPr>
+          <a:lstStyle>
+            <a:lvl1pPr algn="l" defTabSz="457200" rtl="0" eaLnBrk="1" latinLnBrk="0" hangingPunct="1">
+              <a:spcBef>
+                <a:spcPct val="0"/>
+              </a:spcBef>
+              <a:buNone/>
+              <a:defRPr sz="3200" kern="1200" cap="all">
+                <a:ln w="3175" cmpd="sng">
+                  <a:noFill/>
+                </a:ln>
+                <a:solidFill>
+                  <a:schemeClr val="tx1"/>
+                </a:solidFill>
+                <a:effectLst/>
+                <a:latin typeface="+mj-lt"/>
+                <a:ea typeface="+mj-ea"/>
+                <a:cs typeface="+mj-cs"/>
+              </a:defRPr>
+            </a:lvl1pPr>
+            <a:lvl2pPr eaLnBrk="1" hangingPunct="1">
+              <a:defRPr>
+                <a:solidFill>
+                  <a:schemeClr val="tx2"/>
+                </a:solidFill>
+              </a:defRPr>
+            </a:lvl2pPr>
+            <a:lvl3pPr eaLnBrk="1" hangingPunct="1">
+              <a:defRPr>
+                <a:solidFill>
+                  <a:schemeClr val="tx2"/>
+                </a:solidFill>
+              </a:defRPr>
+            </a:lvl3pPr>
+            <a:lvl4pPr eaLnBrk="1" hangingPunct="1">
+              <a:defRPr>
+                <a:solidFill>
+                  <a:schemeClr val="tx2"/>
+                </a:solidFill>
+              </a:defRPr>
+            </a:lvl4pPr>
+            <a:lvl5pPr eaLnBrk="1" hangingPunct="1">
+              <a:defRPr>
+                <a:solidFill>
+                  <a:schemeClr val="tx2"/>
+                </a:solidFill>
+              </a:defRPr>
+            </a:lvl5pPr>
+            <a:lvl6pPr eaLnBrk="1" hangingPunct="1">
+              <a:defRPr>
+                <a:solidFill>
+                  <a:schemeClr val="tx2"/>
+                </a:solidFill>
+              </a:defRPr>
+            </a:lvl6pPr>
+            <a:lvl7pPr eaLnBrk="1" hangingPunct="1">
+              <a:defRPr>
+                <a:solidFill>
+                  <a:schemeClr val="tx2"/>
+                </a:solidFill>
+              </a:defRPr>
+            </a:lvl7pPr>
+            <a:lvl8pPr eaLnBrk="1" hangingPunct="1">
+              <a:defRPr>
+                <a:solidFill>
+                  <a:schemeClr val="tx2"/>
+                </a:solidFill>
+              </a:defRPr>
+            </a:lvl8pPr>
+            <a:lvl9pPr eaLnBrk="1" hangingPunct="1">
+              <a:defRPr>
+                <a:solidFill>
+                  <a:schemeClr val="tx2"/>
+                </a:solidFill>
+              </a:defRPr>
+            </a:lvl9pPr>
+          </a:lstStyle>
+          <a:p>
+            <a:pPr algn="ctr"/>
+            <a:r>
+              <a:rPr lang="en-IN" sz="9600" b="1" dirty="0">
+                <a:solidFill>
+                  <a:srgbClr val="002060"/>
+                </a:solidFill>
+              </a:rPr>
+              <a:t>Thank you</a:t>
+            </a:r>
+          </a:p>
+        </p:txBody>
+      </p:sp>
+    </p:spTree>
+    <p:extLst>
+      <p:ext uri="{BB962C8B-B14F-4D97-AF65-F5344CB8AC3E}">
+        <p14:creationId xmlns:p14="http://schemas.microsoft.com/office/powerpoint/2010/main" val="2300177811"/>
+      </p:ext>
+    </p:extLst>
+  </p:cSld>
+  <p:clrMapOvr>
+    <a:masterClrMapping/>
+  </p:clrMapOvr>
+</p:sld>
+</file>
+
 <file path=ppt/slides/slide2.xml><?xml version="1.0" encoding="utf-8"?>
 <p:sld xmlns:a="http://schemas.openxmlformats.org/drawingml/2006/main" xmlns:r="http://schemas.openxmlformats.org/officeDocument/2006/relationships" xmlns:p="http://schemas.openxmlformats.org/presentationml/2006/main">
   <p:cSld>

</xml_diff>